<commit_message>
agregado commit a var_to_db
</commit_message>
<xml_diff>
--- a/presentacion.pptx
+++ b/presentacion.pptx
@@ -2741,7 +2741,19 @@
               <a:rPr b="0" lang="es-CL" sz="4400" spc="-1" strike="noStrike">
                 <a:latin typeface="Arial"/>
               </a:rPr>
-              <a:t>Click to edit the title text </a:t>
+              <a:t>Click to </a:t>
+            </a:r>
+            <a:r>
+              <a:rPr b="0" lang="es-CL" sz="4400" spc="-1" strike="noStrike">
+                <a:latin typeface="Arial"/>
+              </a:rPr>
+              <a:t>edit the </a:t>
+            </a:r>
+            <a:r>
+              <a:rPr b="0" lang="es-CL" sz="4400" spc="-1" strike="noStrike">
+                <a:latin typeface="Arial"/>
+              </a:rPr>
+              <a:t>title text </a:t>
             </a:r>
             <a:r>
               <a:rPr b="0" lang="es-CL" sz="4400" spc="-1" strike="noStrike">
@@ -6286,7 +6298,7 @@
           <p:nvPr/>
         </p:nvGraphicFramePr>
         <p:xfrm>
-          <a:off x="431280" y="1499040"/>
+          <a:off x="431280" y="1643040"/>
           <a:ext cx="11448360" cy="4838760"/>
         </p:xfrm>
         <a:graphic>
@@ -8075,7 +8087,7 @@
                         <a:rPr b="0" lang="es-CL" sz="1800" spc="-1" strike="noStrike">
                           <a:latin typeface="Arial"/>
                         </a:rPr>
-                        <a:t>linux setup</a:t>
+                        <a:t>linux setup (admin)</a:t>
                       </a:r>
                       <a:endParaRPr b="0" lang="es-CL" sz="1800" spc="-1" strike="noStrike">
                         <a:latin typeface="Arial"/>

</xml_diff>